<commit_message>
PPT & WORD Changes Completed
</commit_message>
<xml_diff>
--- a/8 Chit Fund Management System.pptx
+++ b/8 Chit Fund Management System.pptx
@@ -5,7 +5,7 @@
     <p:sldMasterId id="2147483648" r:id="rId2"/>
   </p:sldMasterIdLst>
   <p:notesMasterIdLst>
-    <p:notesMasterId r:id="rId25"/>
+    <p:notesMasterId r:id="rId24"/>
   </p:notesMasterIdLst>
   <p:sldIdLst>
     <p:sldId id="257" r:id="rId3"/>
@@ -24,12 +24,11 @@
     <p:sldId id="270" r:id="rId16"/>
     <p:sldId id="271" r:id="rId17"/>
     <p:sldId id="272" r:id="rId18"/>
-    <p:sldId id="273" r:id="rId19"/>
-    <p:sldId id="274" r:id="rId20"/>
-    <p:sldId id="275" r:id="rId21"/>
-    <p:sldId id="276" r:id="rId22"/>
-    <p:sldId id="277" r:id="rId23"/>
-    <p:sldId id="278" r:id="rId24"/>
+    <p:sldId id="274" r:id="rId19"/>
+    <p:sldId id="275" r:id="rId20"/>
+    <p:sldId id="276" r:id="rId21"/>
+    <p:sldId id="277" r:id="rId22"/>
+    <p:sldId id="278" r:id="rId23"/>
   </p:sldIdLst>
   <p:sldSz cx="12192000" cy="6858000"/>
   <p:notesSz cx="6858000" cy="9144000"/>
@@ -218,7 +217,7 @@
           <a:p>
             <a:fld id="{66C63451-F71A-45EA-8B10-04A09C28CC19}" type="datetimeFigureOut">
               <a:rPr lang="en-US" smtClean="0"/>
-              <a:t>11/16/2021</a:t>
+              <a:t>11/17/2021</a:t>
             </a:fld>
             <a:endParaRPr lang="en-US" dirty="0"/>
           </a:p>
@@ -25170,15 +25169,7 @@
               <a:rPr lang="en-US" sz="4000" dirty="0">
                 <a:latin typeface="Berlin Sans FB" panose="020E0602020502020306" pitchFamily="34" charset="0"/>
               </a:rPr>
-              <a:t>Modern College of Arts, Science &amp; Commerce (Autonomus</a:t>
-            </a:r>
-            <a:r>
-              <a:rPr lang="en-US" sz="4000" dirty="0">
-                <a:solidFill>
-                  <a:srgbClr val="000099"/>
-                </a:solidFill>
-              </a:rPr>
-              <a:t>)</a:t>
+              <a:t>Modern College of Arts, Science &amp; Commerce (Autonomus)</a:t>
             </a:r>
             <a:br>
               <a:rPr lang="en-US" dirty="0"/>
@@ -25255,6 +25246,36 @@
           </a:p>
         </p:txBody>
       </p:sp>
+      <p:pic>
+        <p:nvPicPr>
+          <p:cNvPr id="4" name="Picture 3">
+            <a:extLst>
+              <a:ext uri="{FF2B5EF4-FFF2-40B4-BE49-F238E27FC236}">
+                <a16:creationId xmlns:a16="http://schemas.microsoft.com/office/drawing/2014/main" id="{321D54AA-B4E8-4500-95B5-9F4E2D384BED}"/>
+              </a:ext>
+            </a:extLst>
+          </p:cNvPr>
+          <p:cNvPicPr>
+            <a:picLocks noChangeAspect="1"/>
+          </p:cNvPicPr>
+          <p:nvPr/>
+        </p:nvPicPr>
+        <p:blipFill>
+          <a:blip r:embed="rId2"/>
+          <a:stretch>
+            <a:fillRect/>
+          </a:stretch>
+        </p:blipFill>
+        <p:spPr>
+          <a:xfrm>
+            <a:off x="2046513" y="2020388"/>
+            <a:ext cx="2542902" cy="1036320"/>
+          </a:xfrm>
+          <a:prstGeom prst="rect">
+            <a:avLst/>
+          </a:prstGeom>
+        </p:spPr>
+      </p:pic>
     </p:spTree>
   </p:cSld>
   <p:clrMapOvr>
@@ -25292,9 +25313,24 @@
         </p:nvSpPr>
         <p:spPr>
           <a:xfrm>
-            <a:off x="3751705" y="0"/>
-            <a:ext cx="4688589" cy="741771"/>
+            <a:off x="489897" y="654839"/>
+            <a:ext cx="10961873" cy="741771"/>
           </a:xfrm>
+          <a:ln>
+            <a:noFill/>
+          </a:ln>
+          <a:effectLst/>
+          <a:scene3d>
+            <a:camera prst="orthographicFront">
+              <a:rot lat="0" lon="0" rev="0"/>
+            </a:camera>
+            <a:lightRig rig="chilly" dir="t">
+              <a:rot lat="0" lon="0" rev="18480000"/>
+            </a:lightRig>
+          </a:scene3d>
+          <a:sp3d prstMaterial="clear">
+            <a:bevelT h="63500"/>
+          </a:sp3d>
         </p:spPr>
         <p:txBody>
           <a:bodyPr>
@@ -25304,14 +25340,20 @@
           <a:p>
             <a:r>
               <a:rPr lang="en-US" sz="4400" b="1" dirty="0"/>
-              <a:t>Context Level DFD</a:t>
+              <a:t>                            Context Level DFD</a:t>
             </a:r>
           </a:p>
         </p:txBody>
       </p:sp>
       <p:pic>
         <p:nvPicPr>
-          <p:cNvPr id="2097156" name="Content Placeholder 3"/>
+          <p:cNvPr id="5" name="Content Placeholder 4">
+            <a:extLst>
+              <a:ext uri="{FF2B5EF4-FFF2-40B4-BE49-F238E27FC236}">
+                <a16:creationId xmlns:a16="http://schemas.microsoft.com/office/drawing/2014/main" id="{38D3E89B-1C33-413A-98BD-4EDE471844B9}"/>
+              </a:ext>
+            </a:extLst>
+          </p:cNvPr>
           <p:cNvPicPr>
             <a:picLocks noGrp="1" noChangeAspect="1"/>
           </p:cNvPicPr>
@@ -25319,26 +25361,17 @@
             <p:ph idx="1"/>
           </p:nvPr>
         </p:nvPicPr>
-        <p:blipFill rotWithShape="1">
+        <p:blipFill>
           <a:blip r:embed="rId2"/>
-          <a:srcRect l="-1690" t="48989" r="1"/>
           <a:stretch>
             <a:fillRect/>
           </a:stretch>
         </p:blipFill>
-        <p:spPr bwMode="auto">
+        <p:spPr>
           <a:xfrm>
-            <a:off x="139336" y="1051559"/>
-            <a:ext cx="11686902" cy="3918857"/>
+            <a:off x="489897" y="1396610"/>
+            <a:ext cx="10961873" cy="3845949"/>
           </a:xfrm>
-          <a:prstGeom prst="rect">
-            <a:avLst/>
-          </a:prstGeom>
-          <a:ln w="19050">
-            <a:solidFill>
-              <a:schemeClr val="bg2"/>
-            </a:solidFill>
-          </a:ln>
         </p:spPr>
       </p:pic>
     </p:spTree>
@@ -25378,9 +25411,24 @@
         </p:nvSpPr>
         <p:spPr>
           <a:xfrm>
-            <a:off x="4471851" y="6084"/>
-            <a:ext cx="3248297" cy="680811"/>
+            <a:off x="2778033" y="6084"/>
+            <a:ext cx="6374675" cy="680811"/>
           </a:xfrm>
+          <a:ln>
+            <a:noFill/>
+          </a:ln>
+          <a:effectLst/>
+          <a:scene3d>
+            <a:camera prst="orthographicFront">
+              <a:rot lat="0" lon="0" rev="0"/>
+            </a:camera>
+            <a:lightRig rig="chilly" dir="t">
+              <a:rot lat="0" lon="0" rev="18480000"/>
+            </a:lightRig>
+          </a:scene3d>
+          <a:sp3d prstMaterial="clear">
+            <a:bevelT h="63500"/>
+          </a:sp3d>
         </p:spPr>
         <p:txBody>
           <a:bodyPr>
@@ -25390,14 +25438,20 @@
           <a:p>
             <a:r>
               <a:rPr lang="en-US" sz="4400" b="1" dirty="0"/>
-              <a:t>Level 1 DFD</a:t>
+              <a:t>            Level 1 DFD</a:t>
             </a:r>
           </a:p>
         </p:txBody>
       </p:sp>
       <p:pic>
         <p:nvPicPr>
-          <p:cNvPr id="2097157" name="Content Placeholder 3"/>
+          <p:cNvPr id="8" name="Content Placeholder 7">
+            <a:extLst>
+              <a:ext uri="{FF2B5EF4-FFF2-40B4-BE49-F238E27FC236}">
+                <a16:creationId xmlns:a16="http://schemas.microsoft.com/office/drawing/2014/main" id="{A9647B51-BD19-42F3-9DEB-8723D5229B36}"/>
+              </a:ext>
+            </a:extLst>
+          </p:cNvPr>
           <p:cNvPicPr>
             <a:picLocks noGrp="1" noChangeAspect="1"/>
           </p:cNvPicPr>
@@ -25405,33 +25459,17 @@
             <p:ph idx="1"/>
           </p:nvPr>
         </p:nvPicPr>
-        <p:blipFill rotWithShape="1">
+        <p:blipFill>
           <a:blip r:embed="rId2"/>
-          <a:srcRect b="815"/>
           <a:stretch>
             <a:fillRect/>
           </a:stretch>
         </p:blipFill>
-        <p:spPr bwMode="auto">
+        <p:spPr>
           <a:xfrm>
-            <a:off x="1654627" y="686895"/>
-            <a:ext cx="8882743" cy="6051718"/>
+            <a:off x="2778033" y="686896"/>
+            <a:ext cx="6374675" cy="6171104"/>
           </a:xfrm>
-          <a:prstGeom prst="rect">
-            <a:avLst/>
-          </a:prstGeom>
-          <a:ln w="19050">
-            <a:solidFill>
-              <a:schemeClr val="tx1"/>
-            </a:solidFill>
-          </a:ln>
-          <a:effectLst>
-            <a:outerShdw blurRad="50800" dist="38100" dir="8100000" algn="tr" rotWithShape="0">
-              <a:prstClr val="black">
-                <a:alpha val="40000"/>
-              </a:prstClr>
-            </a:outerShdw>
-          </a:effectLst>
         </p:spPr>
       </p:pic>
     </p:spTree>
@@ -25461,33 +25499,38 @@
       </p:grpSpPr>
       <p:pic>
         <p:nvPicPr>
-          <p:cNvPr id="2097158" name="Content Placeholder 3"/>
+          <p:cNvPr id="5" name="Picture 4">
+            <a:extLst>
+              <a:ext uri="{FF2B5EF4-FFF2-40B4-BE49-F238E27FC236}">
+                <a16:creationId xmlns:a16="http://schemas.microsoft.com/office/drawing/2014/main" id="{CDFC6267-9BFE-4C85-92B9-BFCEE74FFA69}"/>
+              </a:ext>
+            </a:extLst>
+          </p:cNvPr>
           <p:cNvPicPr>
-            <a:picLocks noGrp="1" noChangeAspect="1"/>
+            <a:picLocks noChangeAspect="1"/>
           </p:cNvPicPr>
-          <p:nvPr>
-            <p:ph idx="1"/>
-          </p:nvPr>
+          <p:nvPr/>
         </p:nvPicPr>
         <p:blipFill>
-          <a:blip r:embed="rId2"/>
+          <a:blip r:embed="rId2">
+            <a:extLst>
+              <a:ext uri="{28A0092B-C50C-407E-A947-70E740481C1C}">
+                <a14:useLocalDpi xmlns:a14="http://schemas.microsoft.com/office/drawing/2010/main" val="0"/>
+              </a:ext>
+            </a:extLst>
+          </a:blip>
           <a:stretch>
             <a:fillRect/>
           </a:stretch>
         </p:blipFill>
         <p:spPr>
           <a:xfrm>
-            <a:off x="1615440" y="166168"/>
-            <a:ext cx="8961120" cy="6525664"/>
+            <a:off x="3470157" y="-60960"/>
+            <a:ext cx="5251686" cy="6918960"/>
           </a:xfrm>
           <a:prstGeom prst="rect">
             <a:avLst/>
           </a:prstGeom>
-          <a:ln w="19050">
-            <a:solidFill>
-              <a:schemeClr val="tx1"/>
-            </a:solidFill>
-          </a:ln>
         </p:spPr>
       </p:pic>
     </p:spTree>
@@ -25517,33 +25560,38 @@
       </p:grpSpPr>
       <p:pic>
         <p:nvPicPr>
-          <p:cNvPr id="2097159" name="Content Placeholder 3"/>
+          <p:cNvPr id="5" name="Picture 4">
+            <a:extLst>
+              <a:ext uri="{FF2B5EF4-FFF2-40B4-BE49-F238E27FC236}">
+                <a16:creationId xmlns:a16="http://schemas.microsoft.com/office/drawing/2014/main" id="{40BC1BD2-2637-4106-90D4-75B65F6900D8}"/>
+              </a:ext>
+            </a:extLst>
+          </p:cNvPr>
           <p:cNvPicPr>
-            <a:picLocks noGrp="1" noChangeAspect="1"/>
+            <a:picLocks noChangeAspect="1"/>
           </p:cNvPicPr>
-          <p:nvPr>
-            <p:ph idx="1"/>
-          </p:nvPr>
+          <p:nvPr/>
         </p:nvPicPr>
         <p:blipFill>
-          <a:blip r:embed="rId2"/>
+          <a:blip r:embed="rId2">
+            <a:extLst>
+              <a:ext uri="{28A0092B-C50C-407E-A947-70E740481C1C}">
+                <a14:useLocalDpi xmlns:a14="http://schemas.microsoft.com/office/drawing/2010/main" val="0"/>
+              </a:ext>
+            </a:extLst>
+          </a:blip>
           <a:stretch>
             <a:fillRect/>
           </a:stretch>
         </p:blipFill>
         <p:spPr>
           <a:xfrm>
-            <a:off x="1048025" y="408643"/>
-            <a:ext cx="10095949" cy="6040713"/>
+            <a:off x="3341808" y="0"/>
+            <a:ext cx="5508384" cy="6858000"/>
           </a:xfrm>
           <a:prstGeom prst="rect">
             <a:avLst/>
           </a:prstGeom>
-          <a:ln w="19050">
-            <a:solidFill>
-              <a:schemeClr val="tx1"/>
-            </a:solidFill>
-          </a:ln>
         </p:spPr>
       </p:pic>
     </p:spTree>
@@ -25573,33 +25621,38 @@
       </p:grpSpPr>
       <p:pic>
         <p:nvPicPr>
-          <p:cNvPr id="2097160" name="Content Placeholder 3"/>
+          <p:cNvPr id="5" name="Picture 4">
+            <a:extLst>
+              <a:ext uri="{FF2B5EF4-FFF2-40B4-BE49-F238E27FC236}">
+                <a16:creationId xmlns:a16="http://schemas.microsoft.com/office/drawing/2014/main" id="{FD3FB045-CAD9-4177-AF15-113C58A2C32B}"/>
+              </a:ext>
+            </a:extLst>
+          </p:cNvPr>
           <p:cNvPicPr>
-            <a:picLocks noGrp="1" noChangeAspect="1"/>
+            <a:picLocks noChangeAspect="1"/>
           </p:cNvPicPr>
-          <p:nvPr>
-            <p:ph idx="1"/>
-          </p:nvPr>
+          <p:nvPr/>
         </p:nvPicPr>
         <p:blipFill>
-          <a:blip r:embed="rId2"/>
+          <a:blip r:embed="rId2">
+            <a:extLst>
+              <a:ext uri="{28A0092B-C50C-407E-A947-70E740481C1C}">
+                <a14:useLocalDpi xmlns:a14="http://schemas.microsoft.com/office/drawing/2010/main" val="0"/>
+              </a:ext>
+            </a:extLst>
+          </a:blip>
           <a:stretch>
             <a:fillRect/>
           </a:stretch>
         </p:blipFill>
         <p:spPr>
           <a:xfrm>
-            <a:off x="1611085" y="144133"/>
-            <a:ext cx="8525691" cy="6569734"/>
+            <a:off x="3460773" y="0"/>
+            <a:ext cx="5270454" cy="6858000"/>
           </a:xfrm>
           <a:prstGeom prst="rect">
             <a:avLst/>
           </a:prstGeom>
-          <a:ln w="19050">
-            <a:solidFill>
-              <a:schemeClr val="tx1"/>
-            </a:solidFill>
-          </a:ln>
         </p:spPr>
       </p:pic>
     </p:spTree>
@@ -25629,34 +25682,38 @@
       </p:grpSpPr>
       <p:pic>
         <p:nvPicPr>
-          <p:cNvPr id="2097161" name="Content Placeholder 3"/>
+          <p:cNvPr id="5" name="Picture 4">
+            <a:extLst>
+              <a:ext uri="{FF2B5EF4-FFF2-40B4-BE49-F238E27FC236}">
+                <a16:creationId xmlns:a16="http://schemas.microsoft.com/office/drawing/2014/main" id="{75FDBE5D-0A9B-45C7-9FF0-8C3F15566C73}"/>
+              </a:ext>
+            </a:extLst>
+          </p:cNvPr>
           <p:cNvPicPr>
-            <a:picLocks noGrp="1" noChangeAspect="1"/>
+            <a:picLocks noChangeAspect="1"/>
           </p:cNvPicPr>
-          <p:nvPr>
-            <p:ph idx="1"/>
-          </p:nvPr>
+          <p:nvPr/>
         </p:nvPicPr>
-        <p:blipFill rotWithShape="1">
-          <a:blip r:embed="rId2"/>
-          <a:srcRect l="1446" t="819" r="13" b="2254"/>
+        <p:blipFill>
+          <a:blip r:embed="rId2">
+            <a:extLst>
+              <a:ext uri="{28A0092B-C50C-407E-A947-70E740481C1C}">
+                <a14:useLocalDpi xmlns:a14="http://schemas.microsoft.com/office/drawing/2010/main" val="0"/>
+              </a:ext>
+            </a:extLst>
+          </a:blip>
           <a:stretch>
             <a:fillRect/>
           </a:stretch>
         </p:blipFill>
-        <p:spPr bwMode="auto">
+        <p:spPr>
           <a:xfrm>
-            <a:off x="1158240" y="304800"/>
-            <a:ext cx="9441942" cy="5878285"/>
+            <a:off x="3341030" y="0"/>
+            <a:ext cx="5509940" cy="6858000"/>
           </a:xfrm>
           <a:prstGeom prst="rect">
             <a:avLst/>
           </a:prstGeom>
-          <a:ln w="19050">
-            <a:solidFill>
-              <a:schemeClr val="tx1"/>
-            </a:solidFill>
-          </a:ln>
         </p:spPr>
       </p:pic>
     </p:spTree>
@@ -25686,33 +25743,38 @@
       </p:grpSpPr>
       <p:pic>
         <p:nvPicPr>
-          <p:cNvPr id="2097162" name="Content Placeholder 3"/>
+          <p:cNvPr id="5" name="Picture 4">
+            <a:extLst>
+              <a:ext uri="{FF2B5EF4-FFF2-40B4-BE49-F238E27FC236}">
+                <a16:creationId xmlns:a16="http://schemas.microsoft.com/office/drawing/2014/main" id="{47F56421-19E3-4C10-A30A-5B9EA91D418B}"/>
+              </a:ext>
+            </a:extLst>
+          </p:cNvPr>
           <p:cNvPicPr>
-            <a:picLocks noGrp="1" noChangeAspect="1"/>
+            <a:picLocks noChangeAspect="1"/>
           </p:cNvPicPr>
-          <p:nvPr>
-            <p:ph idx="1"/>
-          </p:nvPr>
+          <p:nvPr/>
         </p:nvPicPr>
         <p:blipFill>
-          <a:blip r:embed="rId2"/>
+          <a:blip r:embed="rId2">
+            <a:extLst>
+              <a:ext uri="{28A0092B-C50C-407E-A947-70E740481C1C}">
+                <a14:useLocalDpi xmlns:a14="http://schemas.microsoft.com/office/drawing/2010/main" val="0"/>
+              </a:ext>
+            </a:extLst>
+          </a:blip>
           <a:stretch>
             <a:fillRect/>
           </a:stretch>
         </p:blipFill>
         <p:spPr>
           <a:xfrm>
-            <a:off x="1663337" y="139518"/>
-            <a:ext cx="9147659" cy="6400619"/>
+            <a:off x="3475944" y="0"/>
+            <a:ext cx="5240111" cy="6858000"/>
           </a:xfrm>
           <a:prstGeom prst="rect">
             <a:avLst/>
           </a:prstGeom>
-          <a:ln w="19050">
-            <a:solidFill>
-              <a:schemeClr val="tx1"/>
-            </a:solidFill>
-          </a:ln>
         </p:spPr>
       </p:pic>
     </p:spTree>
@@ -25724,62 +25786,6 @@
 </file>
 
 <file path=ppt/slides/slide17.xml><?xml version="1.0" encoding="utf-8"?>
-<p:sld xmlns:a="http://schemas.openxmlformats.org/drawingml/2006/main" xmlns:r="http://schemas.openxmlformats.org/officeDocument/2006/relationships" xmlns:p="http://schemas.openxmlformats.org/presentationml/2006/main">
-  <p:cSld>
-    <p:spTree>
-      <p:nvGrpSpPr>
-        <p:cNvPr id="1" name=""/>
-        <p:cNvGrpSpPr/>
-        <p:nvPr/>
-      </p:nvGrpSpPr>
-      <p:grpSpPr>
-        <a:xfrm>
-          <a:off x="0" y="0"/>
-          <a:ext cx="0" cy="0"/>
-          <a:chOff x="0" y="0"/>
-          <a:chExt cx="0" cy="0"/>
-        </a:xfrm>
-      </p:grpSpPr>
-      <p:pic>
-        <p:nvPicPr>
-          <p:cNvPr id="2097163" name="Content Placeholder 3"/>
-          <p:cNvPicPr>
-            <a:picLocks noGrp="1" noChangeAspect="1"/>
-          </p:cNvPicPr>
-          <p:nvPr>
-            <p:ph idx="1"/>
-          </p:nvPr>
-        </p:nvPicPr>
-        <p:blipFill>
-          <a:blip r:embed="rId2"/>
-          <a:stretch>
-            <a:fillRect/>
-          </a:stretch>
-        </p:blipFill>
-        <p:spPr>
-          <a:xfrm>
-            <a:off x="927769" y="1402305"/>
-            <a:ext cx="10336462" cy="3455388"/>
-          </a:xfrm>
-          <a:prstGeom prst="rect">
-            <a:avLst/>
-          </a:prstGeom>
-          <a:ln w="19050">
-            <a:solidFill>
-              <a:schemeClr val="tx1"/>
-            </a:solidFill>
-          </a:ln>
-        </p:spPr>
-      </p:pic>
-    </p:spTree>
-  </p:cSld>
-  <p:clrMapOvr>
-    <a:masterClrMapping/>
-  </p:clrMapOvr>
-</p:sld>
-</file>
-
-<file path=ppt/slides/slide18.xml><?xml version="1.0" encoding="utf-8"?>
 <p:sld xmlns:a="http://schemas.openxmlformats.org/drawingml/2006/main" xmlns:r="http://schemas.openxmlformats.org/officeDocument/2006/relationships" xmlns:p="http://schemas.openxmlformats.org/presentationml/2006/main">
   <p:cSld>
     <p:spTree>
@@ -25941,7 +25947,7 @@
 </p:sld>
 </file>
 
-<file path=ppt/slides/slide19.xml><?xml version="1.0" encoding="utf-8"?>
+<file path=ppt/slides/slide18.xml><?xml version="1.0" encoding="utf-8"?>
 <p:sld xmlns:a="http://schemas.openxmlformats.org/drawingml/2006/main" xmlns:r="http://schemas.openxmlformats.org/officeDocument/2006/relationships" xmlns:p="http://schemas.openxmlformats.org/presentationml/2006/main">
   <p:cSld>
     <p:spTree>
@@ -26048,6 +26054,142 @@
               </a:rPr>
               <a:t>4.Online payment option are not applicable in the proposed system.</a:t>
             </a:r>
+          </a:p>
+        </p:txBody>
+      </p:sp>
+    </p:spTree>
+  </p:cSld>
+  <p:clrMapOvr>
+    <a:masterClrMapping/>
+  </p:clrMapOvr>
+</p:sld>
+</file>
+
+<file path=ppt/slides/slide19.xml><?xml version="1.0" encoding="utf-8"?>
+<p:sld xmlns:a="http://schemas.openxmlformats.org/drawingml/2006/main" xmlns:r="http://schemas.openxmlformats.org/officeDocument/2006/relationships" xmlns:p="http://schemas.openxmlformats.org/presentationml/2006/main">
+  <p:cSld>
+    <p:spTree>
+      <p:nvGrpSpPr>
+        <p:cNvPr id="1" name=""/>
+        <p:cNvGrpSpPr/>
+        <p:nvPr/>
+      </p:nvGrpSpPr>
+      <p:grpSpPr>
+        <a:xfrm>
+          <a:off x="0" y="0"/>
+          <a:ext cx="0" cy="0"/>
+          <a:chOff x="0" y="0"/>
+          <a:chExt cx="0" cy="0"/>
+        </a:xfrm>
+      </p:grpSpPr>
+      <p:sp>
+        <p:nvSpPr>
+          <p:cNvPr id="1048763" name="Title 1"/>
+          <p:cNvSpPr>
+            <a:spLocks noGrp="1"/>
+          </p:cNvSpPr>
+          <p:nvPr>
+            <p:ph type="title"/>
+          </p:nvPr>
+        </p:nvSpPr>
+        <p:spPr>
+          <a:xfrm>
+            <a:off x="3769123" y="209005"/>
+            <a:ext cx="5106600" cy="714103"/>
+          </a:xfrm>
+        </p:spPr>
+        <p:txBody>
+          <a:bodyPr>
+            <a:normAutofit fontScale="90000"/>
+          </a:bodyPr>
+          <a:lstStyle/>
+          <a:p>
+            <a:r>
+              <a:rPr lang="en-US" sz="4400" b="1" dirty="0"/>
+              <a:t>Future Enhancement</a:t>
+            </a:r>
+          </a:p>
+        </p:txBody>
+      </p:sp>
+      <p:sp>
+        <p:nvSpPr>
+          <p:cNvPr id="1048764" name="Content Placeholder 2"/>
+          <p:cNvSpPr>
+            <a:spLocks noGrp="1"/>
+          </p:cNvSpPr>
+          <p:nvPr>
+            <p:ph idx="1"/>
+          </p:nvPr>
+        </p:nvSpPr>
+        <p:spPr>
+          <a:xfrm>
+            <a:off x="0" y="1001487"/>
+            <a:ext cx="12191999" cy="5495108"/>
+          </a:xfrm>
+          <a:ln>
+            <a:noFill/>
+          </a:ln>
+          <a:effectLst/>
+          <a:scene3d>
+            <a:camera prst="orthographicFront">
+              <a:rot lat="0" lon="0" rev="0"/>
+            </a:camera>
+            <a:lightRig rig="chilly" dir="t">
+              <a:rot lat="0" lon="0" rev="18480000"/>
+            </a:lightRig>
+          </a:scene3d>
+          <a:sp3d prstMaterial="clear">
+            <a:bevelT h="63500"/>
+          </a:sp3d>
+        </p:spPr>
+        <p:txBody>
+          <a:bodyPr/>
+          <a:lstStyle/>
+          <a:p>
+            <a:r>
+              <a:rPr lang="en-US" dirty="0">
+                <a:solidFill>
+                  <a:schemeClr val="tx1">
+                    <a:lumMod val="75000"/>
+                    <a:lumOff val="25000"/>
+                  </a:schemeClr>
+                </a:solidFill>
+                <a:effectLst/>
+                <a:latin typeface="Arial Rounded MT Bold" panose="020F0704030504030204" pitchFamily="34" charset="0"/>
+                <a:ea typeface="Times New Roman" panose="02020603050405020304" pitchFamily="18" charset="0"/>
+              </a:rPr>
+              <a:t>Every application has its own merits and demerits. The projects has covered all the requirements. Further requirement and improvement can easily done since the coding is mainly structured for this project. Changing the existing modules or adding new modules can be a improvements. In future the system not only access by admin and employee but also access by member’s and agent’s by that company will required less manpower and less time to do work. Security of system will also enhance by providing appropriate authentication to appropriate user</a:t>
+            </a:r>
+            <a:r>
+              <a:rPr lang="en-US" dirty="0">
+                <a:solidFill>
+                  <a:schemeClr val="tx1">
+                    <a:lumMod val="75000"/>
+                    <a:lumOff val="25000"/>
+                  </a:schemeClr>
+                </a:solidFill>
+                <a:latin typeface="Arial Rounded MT Bold" panose="020F0704030504030204" pitchFamily="34" charset="0"/>
+                <a:ea typeface="Times New Roman" panose="02020603050405020304" pitchFamily="18" charset="0"/>
+              </a:rPr>
+              <a:t>.</a:t>
+            </a:r>
+            <a:r>
+              <a:rPr lang="en-US" dirty="0">
+                <a:solidFill>
+                  <a:schemeClr val="tx1">
+                    <a:lumMod val="75000"/>
+                    <a:lumOff val="25000"/>
+                  </a:schemeClr>
+                </a:solidFill>
+                <a:effectLst/>
+                <a:latin typeface="Arial Rounded MT Bold" panose="020F0704030504030204" pitchFamily="34" charset="0"/>
+                <a:ea typeface="Times New Roman" panose="02020603050405020304" pitchFamily="18" charset="0"/>
+              </a:rPr>
+              <a:t> We would try to add multiple Language as an option for the clients.</a:t>
+            </a:r>
+          </a:p>
+          <a:p>
+            <a:endParaRPr lang="en-US" dirty="0"/>
           </a:p>
         </p:txBody>
       </p:sp>
@@ -26283,7 +26425,7 @@
         </p:spPr>
         <p:txBody>
           <a:bodyPr vert="horz" lIns="91440" tIns="45720" rIns="91440" bIns="45720" rtlCol="0">
-            <a:normAutofit fontScale="87500"/>
+            <a:normAutofit fontScale="87500" lnSpcReduction="10000"/>
           </a:bodyPr>
           <a:lstStyle>
             <a:lvl1pPr marL="360000" indent="-360000" algn="ctr" defTabSz="914400" rtl="0" eaLnBrk="1" latinLnBrk="0" hangingPunct="1">
@@ -26570,142 +26712,6 @@
       </p:grpSpPr>
       <p:sp>
         <p:nvSpPr>
-          <p:cNvPr id="1048763" name="Title 1"/>
-          <p:cNvSpPr>
-            <a:spLocks noGrp="1"/>
-          </p:cNvSpPr>
-          <p:nvPr>
-            <p:ph type="title"/>
-          </p:nvPr>
-        </p:nvSpPr>
-        <p:spPr>
-          <a:xfrm>
-            <a:off x="3769123" y="209005"/>
-            <a:ext cx="5106600" cy="714103"/>
-          </a:xfrm>
-        </p:spPr>
-        <p:txBody>
-          <a:bodyPr>
-            <a:normAutofit fontScale="90000"/>
-          </a:bodyPr>
-          <a:lstStyle/>
-          <a:p>
-            <a:r>
-              <a:rPr lang="en-US" sz="4400" b="1" dirty="0"/>
-              <a:t>Future Enhancement</a:t>
-            </a:r>
-          </a:p>
-        </p:txBody>
-      </p:sp>
-      <p:sp>
-        <p:nvSpPr>
-          <p:cNvPr id="1048764" name="Content Placeholder 2"/>
-          <p:cNvSpPr>
-            <a:spLocks noGrp="1"/>
-          </p:cNvSpPr>
-          <p:nvPr>
-            <p:ph idx="1"/>
-          </p:nvPr>
-        </p:nvSpPr>
-        <p:spPr>
-          <a:xfrm>
-            <a:off x="0" y="1001487"/>
-            <a:ext cx="12191999" cy="5495108"/>
-          </a:xfrm>
-          <a:ln>
-            <a:noFill/>
-          </a:ln>
-          <a:effectLst/>
-          <a:scene3d>
-            <a:camera prst="orthographicFront">
-              <a:rot lat="0" lon="0" rev="0"/>
-            </a:camera>
-            <a:lightRig rig="chilly" dir="t">
-              <a:rot lat="0" lon="0" rev="18480000"/>
-            </a:lightRig>
-          </a:scene3d>
-          <a:sp3d prstMaterial="clear">
-            <a:bevelT h="63500"/>
-          </a:sp3d>
-        </p:spPr>
-        <p:txBody>
-          <a:bodyPr/>
-          <a:lstStyle/>
-          <a:p>
-            <a:r>
-              <a:rPr lang="en-US" dirty="0">
-                <a:solidFill>
-                  <a:schemeClr val="tx1">
-                    <a:lumMod val="75000"/>
-                    <a:lumOff val="25000"/>
-                  </a:schemeClr>
-                </a:solidFill>
-                <a:effectLst/>
-                <a:latin typeface="Arial Rounded MT Bold" panose="020F0704030504030204" pitchFamily="34" charset="0"/>
-                <a:ea typeface="Times New Roman" panose="02020603050405020304" pitchFamily="18" charset="0"/>
-              </a:rPr>
-              <a:t>Every application has its own merits and demerits. The projects has covered all the requirements. Further requirement and improvement can easily done since the coding is mainly structured for this project. Changing the existing modules or adding new modules can be a improvements. In future the system not only access by admin and employee but also access by member’s and agent’s by that company will required less manpower and less time to do work. Security of system will also enhance by providing appropriate authentication to appropriate user</a:t>
-            </a:r>
-            <a:r>
-              <a:rPr lang="en-US" dirty="0">
-                <a:solidFill>
-                  <a:schemeClr val="tx1">
-                    <a:lumMod val="75000"/>
-                    <a:lumOff val="25000"/>
-                  </a:schemeClr>
-                </a:solidFill>
-                <a:latin typeface="Arial Rounded MT Bold" panose="020F0704030504030204" pitchFamily="34" charset="0"/>
-                <a:ea typeface="Times New Roman" panose="02020603050405020304" pitchFamily="18" charset="0"/>
-              </a:rPr>
-              <a:t>.</a:t>
-            </a:r>
-            <a:r>
-              <a:rPr lang="en-US" dirty="0">
-                <a:solidFill>
-                  <a:schemeClr val="tx1">
-                    <a:lumMod val="75000"/>
-                    <a:lumOff val="25000"/>
-                  </a:schemeClr>
-                </a:solidFill>
-                <a:effectLst/>
-                <a:latin typeface="Arial Rounded MT Bold" panose="020F0704030504030204" pitchFamily="34" charset="0"/>
-                <a:ea typeface="Times New Roman" panose="02020603050405020304" pitchFamily="18" charset="0"/>
-              </a:rPr>
-              <a:t> We would try to add multiple Language as an option for the clients.</a:t>
-            </a:r>
-          </a:p>
-          <a:p>
-            <a:endParaRPr lang="en-US" dirty="0"/>
-          </a:p>
-        </p:txBody>
-      </p:sp>
-    </p:spTree>
-  </p:cSld>
-  <p:clrMapOvr>
-    <a:masterClrMapping/>
-  </p:clrMapOvr>
-</p:sld>
-</file>
-
-<file path=ppt/slides/slide21.xml><?xml version="1.0" encoding="utf-8"?>
-<p:sld xmlns:a="http://schemas.openxmlformats.org/drawingml/2006/main" xmlns:r="http://schemas.openxmlformats.org/officeDocument/2006/relationships" xmlns:p="http://schemas.openxmlformats.org/presentationml/2006/main">
-  <p:cSld>
-    <p:spTree>
-      <p:nvGrpSpPr>
-        <p:cNvPr id="1" name=""/>
-        <p:cNvGrpSpPr/>
-        <p:nvPr/>
-      </p:nvGrpSpPr>
-      <p:grpSpPr>
-        <a:xfrm>
-          <a:off x="0" y="0"/>
-          <a:ext cx="0" cy="0"/>
-          <a:chOff x="0" y="0"/>
-          <a:chExt cx="0" cy="0"/>
-        </a:xfrm>
-      </p:grpSpPr>
-      <p:sp>
-        <p:nvSpPr>
           <p:cNvPr id="1048765" name="Title 1"/>
           <p:cNvSpPr>
             <a:spLocks noGrp="1"/>
@@ -26869,7 +26875,7 @@
 </p:sld>
 </file>
 
-<file path=ppt/slides/slide22.xml><?xml version="1.0" encoding="utf-8"?>
+<file path=ppt/slides/slide21.xml><?xml version="1.0" encoding="utf-8"?>
 <p:sld xmlns:a="http://schemas.openxmlformats.org/drawingml/2006/main" xmlns:r="http://schemas.openxmlformats.org/officeDocument/2006/relationships" xmlns:p="http://schemas.openxmlformats.org/presentationml/2006/main">
   <p:cSld>
     <p:bg>
@@ -26945,7 +26951,7 @@
           <a:p>
             <a:fld id="{D39607A7-8386-47DB-8578-DDEDD194E5D4}" type="slidenum">
               <a:rPr lang="en-US" smtClean="0"/>
-              <a:t>22</a:t>
+              <a:t>21</a:t>
             </a:fld>
             <a:endParaRPr lang="en-US" dirty="0"/>
           </a:p>

</xml_diff>